<commit_message>
More QC checks for test-code.Rmd
</commit_message>
<xml_diff>
--- a/results/test-code.pptx
+++ b/results/test-code.pptx
@@ -5,7 +5,7 @@
     <p:sldMasterId id="2147483648" r:id="rId1"/>
   </p:sldMasterIdLst>
   <p:notesMasterIdLst>
-    <p:notesMasterId r:id="rId73"/>
+    <p:notesMasterId r:id="rId78"/>
   </p:notesMasterIdLst>
   <p:sldIdLst>
     <p:sldId id="256" r:id="rId2"/>
@@ -79,6 +79,11 @@
     <p:sldId id="324" r:id="rId70"/>
     <p:sldId id="325" r:id="rId71"/>
     <p:sldId id="326" r:id="rId72"/>
+    <p:sldId id="327" r:id="rId73"/>
+    <p:sldId id="328" r:id="rId74"/>
+    <p:sldId id="329" r:id="rId75"/>
+    <p:sldId id="330" r:id="rId76"/>
+    <p:sldId id="331" r:id="rId77"/>
   </p:sldIdLst>
   <p:sldSz cx="12192000" cy="6858000"/>
   <p:notesSz cx="6858000" cy="9144000"/>
@@ -616,7 +621,7 @@
           <a:p>
             <a:fld id="{18BDFEC3-8487-43E8-A154-7C12CBC1FFF2}" type="slidenum">
               <a:rPr lang="en-US"/>
-              <a:t>5</a:t>
+              <a:t>10</a:t>
             </a:fld>
             <a:endParaRPr lang="en-US"/>
           </a:p>
@@ -838,7 +843,7 @@
           <a:p>
             <a:fld id="{18BDFEC3-8487-43E8-A154-7C12CBC1FFF2}" type="slidenum">
               <a:rPr lang="en-US"/>
-              <a:t>25</a:t>
+              <a:t>30</a:t>
             </a:fld>
             <a:endParaRPr lang="en-US"/>
           </a:p>
@@ -920,7 +925,7 @@
           <a:p>
             <a:fld id="{18BDFEC3-8487-43E8-A154-7C12CBC1FFF2}" type="slidenum">
               <a:rPr lang="en-US"/>
-              <a:t>28</a:t>
+              <a:t>33</a:t>
             </a:fld>
             <a:endParaRPr lang="en-US"/>
           </a:p>
@@ -1016,7 +1021,7 @@
           <a:p>
             <a:fld id="{18BDFEC3-8487-43E8-A154-7C12CBC1FFF2}" type="slidenum">
               <a:rPr lang="en-US"/>
-              <a:t>29</a:t>
+              <a:t>34</a:t>
             </a:fld>
             <a:endParaRPr lang="en-US"/>
           </a:p>
@@ -1098,7 +1103,7 @@
           <a:p>
             <a:fld id="{18BDFEC3-8487-43E8-A154-7C12CBC1FFF2}" type="slidenum">
               <a:rPr lang="en-US"/>
-              <a:t>31</a:t>
+              <a:t>36</a:t>
             </a:fld>
             <a:endParaRPr lang="en-US"/>
           </a:p>
@@ -1236,7 +1241,7 @@
           <a:p>
             <a:fld id="{18BDFEC3-8487-43E8-A154-7C12CBC1FFF2}" type="slidenum">
               <a:rPr lang="en-US"/>
-              <a:t>33</a:t>
+              <a:t>38</a:t>
             </a:fld>
             <a:endParaRPr lang="en-US"/>
           </a:p>
@@ -1332,7 +1337,7 @@
           <a:p>
             <a:fld id="{18BDFEC3-8487-43E8-A154-7C12CBC1FFF2}" type="slidenum">
               <a:rPr lang="en-US"/>
-              <a:t>35</a:t>
+              <a:t>40</a:t>
             </a:fld>
             <a:endParaRPr lang="en-US"/>
           </a:p>
@@ -1442,7 +1447,7 @@
           <a:p>
             <a:fld id="{18BDFEC3-8487-43E8-A154-7C12CBC1FFF2}" type="slidenum">
               <a:rPr lang="en-US"/>
-              <a:t>36</a:t>
+              <a:t>41</a:t>
             </a:fld>
             <a:endParaRPr lang="en-US"/>
           </a:p>
@@ -1524,7 +1529,7 @@
           <a:p>
             <a:fld id="{18BDFEC3-8487-43E8-A154-7C12CBC1FFF2}" type="slidenum">
               <a:rPr lang="en-US"/>
-              <a:t>38</a:t>
+              <a:t>43</a:t>
             </a:fld>
             <a:endParaRPr lang="en-US"/>
           </a:p>
@@ -1620,7 +1625,7 @@
           <a:p>
             <a:fld id="{18BDFEC3-8487-43E8-A154-7C12CBC1FFF2}" type="slidenum">
               <a:rPr lang="en-US"/>
-              <a:t>39</a:t>
+              <a:t>44</a:t>
             </a:fld>
             <a:endParaRPr lang="en-US"/>
           </a:p>
@@ -1716,7 +1721,7 @@
           <a:p>
             <a:fld id="{18BDFEC3-8487-43E8-A154-7C12CBC1FFF2}" type="slidenum">
               <a:rPr lang="en-US"/>
-              <a:t>42</a:t>
+              <a:t>47</a:t>
             </a:fld>
             <a:endParaRPr lang="en-US"/>
           </a:p>
@@ -1826,7 +1831,7 @@
           <a:p>
             <a:fld id="{18BDFEC3-8487-43E8-A154-7C12CBC1FFF2}" type="slidenum">
               <a:rPr lang="en-US"/>
-              <a:t>7</a:t>
+              <a:t>12</a:t>
             </a:fld>
             <a:endParaRPr lang="en-US"/>
           </a:p>
@@ -1922,7 +1927,7 @@
           <a:p>
             <a:fld id="{18BDFEC3-8487-43E8-A154-7C12CBC1FFF2}" type="slidenum">
               <a:rPr lang="en-US"/>
-              <a:t>43</a:t>
+              <a:t>48</a:t>
             </a:fld>
             <a:endParaRPr lang="en-US"/>
           </a:p>
@@ -2004,7 +2009,7 @@
           <a:p>
             <a:fld id="{18BDFEC3-8487-43E8-A154-7C12CBC1FFF2}" type="slidenum">
               <a:rPr lang="en-US"/>
-              <a:t>45</a:t>
+              <a:t>50</a:t>
             </a:fld>
             <a:endParaRPr lang="en-US"/>
           </a:p>
@@ -2100,7 +2105,7 @@
           <a:p>
             <a:fld id="{18BDFEC3-8487-43E8-A154-7C12CBC1FFF2}" type="slidenum">
               <a:rPr lang="en-US"/>
-              <a:t>46</a:t>
+              <a:t>51</a:t>
             </a:fld>
             <a:endParaRPr lang="en-US"/>
           </a:p>
@@ -2182,7 +2187,7 @@
           <a:p>
             <a:fld id="{18BDFEC3-8487-43E8-A154-7C12CBC1FFF2}" type="slidenum">
               <a:rPr lang="en-US"/>
-              <a:t>48</a:t>
+              <a:t>53</a:t>
             </a:fld>
             <a:endParaRPr lang="en-US"/>
           </a:p>
@@ -2278,7 +2283,7 @@
           <a:p>
             <a:fld id="{18BDFEC3-8487-43E8-A154-7C12CBC1FFF2}" type="slidenum">
               <a:rPr lang="en-US"/>
-              <a:t>49</a:t>
+              <a:t>54</a:t>
             </a:fld>
             <a:endParaRPr lang="en-US"/>
           </a:p>
@@ -2360,7 +2365,7 @@
           <a:p>
             <a:fld id="{18BDFEC3-8487-43E8-A154-7C12CBC1FFF2}" type="slidenum">
               <a:rPr lang="en-US"/>
-              <a:t>51</a:t>
+              <a:t>56</a:t>
             </a:fld>
             <a:endParaRPr lang="en-US"/>
           </a:p>
@@ -2456,7 +2461,7 @@
           <a:p>
             <a:fld id="{18BDFEC3-8487-43E8-A154-7C12CBC1FFF2}" type="slidenum">
               <a:rPr lang="en-US"/>
-              <a:t>52</a:t>
+              <a:t>57</a:t>
             </a:fld>
             <a:endParaRPr lang="en-US"/>
           </a:p>
@@ -2538,7 +2543,7 @@
           <a:p>
             <a:fld id="{18BDFEC3-8487-43E8-A154-7C12CBC1FFF2}" type="slidenum">
               <a:rPr lang="en-US"/>
-              <a:t>54</a:t>
+              <a:t>59</a:t>
             </a:fld>
             <a:endParaRPr lang="en-US"/>
           </a:p>
@@ -2634,7 +2639,7 @@
           <a:p>
             <a:fld id="{18BDFEC3-8487-43E8-A154-7C12CBC1FFF2}" type="slidenum">
               <a:rPr lang="en-US"/>
-              <a:t>55</a:t>
+              <a:t>60</a:t>
             </a:fld>
             <a:endParaRPr lang="en-US"/>
           </a:p>
@@ -2730,7 +2735,7 @@
           <a:p>
             <a:fld id="{18BDFEC3-8487-43E8-A154-7C12CBC1FFF2}" type="slidenum">
               <a:rPr lang="en-US"/>
-              <a:t>56</a:t>
+              <a:t>61</a:t>
             </a:fld>
             <a:endParaRPr lang="en-US"/>
           </a:p>
@@ -2812,7 +2817,7 @@
           <a:p>
             <a:fld id="{18BDFEC3-8487-43E8-A154-7C12CBC1FFF2}" type="slidenum">
               <a:rPr lang="en-US"/>
-              <a:t>11</a:t>
+              <a:t>16</a:t>
             </a:fld>
             <a:endParaRPr lang="en-US"/>
           </a:p>
@@ -2894,7 +2899,7 @@
           <a:p>
             <a:fld id="{18BDFEC3-8487-43E8-A154-7C12CBC1FFF2}" type="slidenum">
               <a:rPr lang="en-US"/>
-              <a:t>58</a:t>
+              <a:t>63</a:t>
             </a:fld>
             <a:endParaRPr lang="en-US"/>
           </a:p>
@@ -2990,7 +2995,7 @@
           <a:p>
             <a:fld id="{18BDFEC3-8487-43E8-A154-7C12CBC1FFF2}" type="slidenum">
               <a:rPr lang="en-US"/>
-              <a:t>59</a:t>
+              <a:t>64</a:t>
             </a:fld>
             <a:endParaRPr lang="en-US"/>
           </a:p>
@@ -3086,7 +3091,7 @@
           <a:p>
             <a:fld id="{18BDFEC3-8487-43E8-A154-7C12CBC1FFF2}" type="slidenum">
               <a:rPr lang="en-US"/>
-              <a:t>60</a:t>
+              <a:t>65</a:t>
             </a:fld>
             <a:endParaRPr lang="en-US"/>
           </a:p>
@@ -3182,7 +3187,7 @@
           <a:p>
             <a:fld id="{18BDFEC3-8487-43E8-A154-7C12CBC1FFF2}" type="slidenum">
               <a:rPr lang="en-US"/>
-              <a:t>62</a:t>
+              <a:t>67</a:t>
             </a:fld>
             <a:endParaRPr lang="en-US"/>
           </a:p>
@@ -3264,7 +3269,7 @@
           <a:p>
             <a:fld id="{18BDFEC3-8487-43E8-A154-7C12CBC1FFF2}" type="slidenum">
               <a:rPr lang="en-US"/>
-              <a:t>64</a:t>
+              <a:t>69</a:t>
             </a:fld>
             <a:endParaRPr lang="en-US"/>
           </a:p>
@@ -3360,7 +3365,7 @@
           <a:p>
             <a:fld id="{18BDFEC3-8487-43E8-A154-7C12CBC1FFF2}" type="slidenum">
               <a:rPr lang="en-US"/>
-              <a:t>65</a:t>
+              <a:t>70</a:t>
             </a:fld>
             <a:endParaRPr lang="en-US"/>
           </a:p>
@@ -3442,7 +3447,7 @@
           <a:p>
             <a:fld id="{18BDFEC3-8487-43E8-A154-7C12CBC1FFF2}" type="slidenum">
               <a:rPr lang="en-US"/>
-              <a:t>67</a:t>
+              <a:t>72</a:t>
             </a:fld>
             <a:endParaRPr lang="en-US"/>
           </a:p>
@@ -3538,7 +3543,7 @@
           <a:p>
             <a:fld id="{18BDFEC3-8487-43E8-A154-7C12CBC1FFF2}" type="slidenum">
               <a:rPr lang="en-US"/>
-              <a:t>68</a:t>
+              <a:t>73</a:t>
             </a:fld>
             <a:endParaRPr lang="en-US"/>
           </a:p>
@@ -3634,7 +3639,7 @@
           <a:p>
             <a:fld id="{18BDFEC3-8487-43E8-A154-7C12CBC1FFF2}" type="slidenum">
               <a:rPr lang="en-US"/>
-              <a:t>70</a:t>
+              <a:t>75</a:t>
             </a:fld>
             <a:endParaRPr lang="en-US"/>
           </a:p>
@@ -3730,7 +3735,7 @@
           <a:p>
             <a:fld id="{18BDFEC3-8487-43E8-A154-7C12CBC1FFF2}" type="slidenum">
               <a:rPr lang="en-US"/>
-              <a:t>71</a:t>
+              <a:t>76</a:t>
             </a:fld>
             <a:endParaRPr lang="en-US"/>
           </a:p>
@@ -3854,7 +3859,7 @@
           <a:p>
             <a:fld id="{18BDFEC3-8487-43E8-A154-7C12CBC1FFF2}" type="slidenum">
               <a:rPr lang="en-US"/>
-              <a:t>15</a:t>
+              <a:t>20</a:t>
             </a:fld>
             <a:endParaRPr lang="en-US"/>
           </a:p>
@@ -4020,7 +4025,7 @@
           <a:p>
             <a:fld id="{18BDFEC3-8487-43E8-A154-7C12CBC1FFF2}" type="slidenum">
               <a:rPr lang="en-US"/>
-              <a:t>17</a:t>
+              <a:t>22</a:t>
             </a:fld>
             <a:endParaRPr lang="en-US"/>
           </a:p>
@@ -4114,7 +4119,7 @@
           <a:p>
             <a:fld id="{18BDFEC3-8487-43E8-A154-7C12CBC1FFF2}" type="slidenum">
               <a:rPr lang="en-US"/>
-              <a:t>18</a:t>
+              <a:t>23</a:t>
             </a:fld>
             <a:endParaRPr lang="en-US"/>
           </a:p>
@@ -4210,7 +4215,7 @@
           <a:p>
             <a:fld id="{18BDFEC3-8487-43E8-A154-7C12CBC1FFF2}" type="slidenum">
               <a:rPr lang="en-US"/>
-              <a:t>20</a:t>
+              <a:t>25</a:t>
             </a:fld>
             <a:endParaRPr lang="en-US"/>
           </a:p>
@@ -4318,7 +4323,7 @@
           <a:p>
             <a:fld id="{18BDFEC3-8487-43E8-A154-7C12CBC1FFF2}" type="slidenum">
               <a:rPr lang="en-US"/>
-              <a:t>21</a:t>
+              <a:t>26</a:t>
             </a:fld>
             <a:endParaRPr lang="en-US"/>
           </a:p>
@@ -4442,7 +4447,7 @@
           <a:p>
             <a:fld id="{18BDFEC3-8487-43E8-A154-7C12CBC1FFF2}" type="slidenum">
               <a:rPr lang="en-US"/>
-              <a:t>24</a:t>
+              <a:t>29</a:t>
             </a:fld>
             <a:endParaRPr lang="en-US"/>
           </a:p>
@@ -7549,7 +7554,7 @@
             </a:pPr>
             <a:r>
               <a:rPr/>
-              <a:t>SAS Code: Part03. Read in your data</a:t>
+              <a:t>SAS Code: Part01. Documentation header</a:t>
             </a:r>
           </a:p>
         </p:txBody>
@@ -7577,14 +7582,12 @@
                 <a:latin typeface="Courier"/>
               </a:rPr>
               <a:t>
-    age
-    wt
-    ht
-    bmi
-    ffw
-    neck
-    chest
-    abdomen
+* 5507-02-simon-continuous-variables.sas
+* author: Steve Simon
+* date: created 2021-05-30
+* purpose: to work with continuous variables
+* license: public domain;
+options papersize=(6 4); 
 </a:t>
             </a:r>
           </a:p>
@@ -7632,42 +7635,7 @@
             </a:pPr>
             <a:r>
               <a:rPr/>
-              <a:t>SAS Code: Part03. Read in your data</a:t>
-            </a:r>
-          </a:p>
-        </p:txBody>
-      </p:sp>
-      <p:sp>
-        <p:nvSpPr>
-          <p:cNvPr id="3" name="Content Placeholder 2"/>
-          <p:cNvSpPr>
-            <a:spLocks noGrp="1"/>
-          </p:cNvSpPr>
-          <p:nvPr>
-            <p:ph idx="1"/>
-          </p:nvPr>
-        </p:nvSpPr>
-        <p:spPr/>
-        <p:txBody>
-          <a:bodyPr/>
-          <a:lstStyle/>
-          <a:p>
-            <a:pPr lvl="0" indent="0">
-              <a:buNone/>
-            </a:pPr>
-            <a:r>
-              <a:rPr>
-                <a:latin typeface="Courier"/>
-              </a:rPr>
-              <a:t>
-    hip
-    thigh
-    knee
-    ankle
-    biceps
-    forearm
-    wrist;
-</a:t>
+              <a:t>Chunk 2</a:t>
             </a:r>
           </a:p>
         </p:txBody>
@@ -7714,7 +7682,41 @@
             </a:pPr>
             <a:r>
               <a:rPr/>
-              <a:t>Chunk 4</a:t>
+              <a:t>SAS Code: Part02. Tell SAS where to find and store things.</a:t>
+            </a:r>
+          </a:p>
+        </p:txBody>
+      </p:sp>
+      <p:sp>
+        <p:nvSpPr>
+          <p:cNvPr id="3" name="Content Placeholder 2"/>
+          <p:cNvSpPr>
+            <a:spLocks noGrp="1"/>
+          </p:cNvSpPr>
+          <p:nvPr>
+            <p:ph idx="1"/>
+          </p:nvPr>
+        </p:nvSpPr>
+        <p:spPr/>
+        <p:txBody>
+          <a:bodyPr/>
+          <a:lstStyle/>
+          <a:p>
+            <a:pPr lvl="0" indent="0">
+              <a:buNone/>
+            </a:pPr>
+            <a:r>
+              <a:rPr>
+                <a:latin typeface="Courier"/>
+              </a:rPr>
+              <a:t>
+filename fat
+  "q:/introduction-to-sas/data/fat.txt";
+libname intro
+  "q:/introduction-to-sas/data";
+ods pdf file=
+  "q:/introduction-to-sas/results/5507-02-simon-continuous-variables.pdf";
+</a:t>
             </a:r>
           </a:p>
         </p:txBody>
@@ -7761,42 +7763,7 @@
             </a:pPr>
             <a:r>
               <a:rPr/>
-              <a:t>SAS Code: Part04. Add variable labels</a:t>
-            </a:r>
-          </a:p>
-        </p:txBody>
-      </p:sp>
-      <p:sp>
-        <p:nvSpPr>
-          <p:cNvPr id="3" name="Content Placeholder 2"/>
-          <p:cNvSpPr>
-            <a:spLocks noGrp="1"/>
-          </p:cNvSpPr>
-          <p:nvPr>
-            <p:ph idx="1"/>
-          </p:nvPr>
-        </p:nvSpPr>
-        <p:spPr/>
-        <p:txBody>
-          <a:bodyPr/>
-          <a:lstStyle/>
-          <a:p>
-            <a:pPr lvl="0" indent="0">
-              <a:buNone/>
-            </a:pPr>
-            <a:r>
-              <a:rPr>
-                <a:latin typeface="Courier"/>
-              </a:rPr>
-              <a:t>
-label
-    case="Case number"
-    fat_brozek="Fat (Brozek's equation)"
-    fat_siri="Fat (Siri's equation)"
-    dens="Density"
-    age="Age (yrs)"
-    wt="Weight (lbs)"
-</a:t>
+              <a:t>Chunk 3</a:t>
             </a:r>
           </a:p>
         </p:txBody>
@@ -7843,7 +7810,7 @@
             </a:pPr>
             <a:r>
               <a:rPr/>
-              <a:t>SAS Code: Part04. Add variable labels</a:t>
+              <a:t>SAS Code: Part03. Read in your data</a:t>
             </a:r>
           </a:p>
         </p:txBody>
@@ -7871,13 +7838,13 @@
                 <a:latin typeface="Courier"/>
               </a:rPr>
               <a:t>
-    ht="Height (inches)"
-    bmi="Body mass index (kg/m^2)"
-    ffw="Fat Free Weight (lbs)"
-    neck="Neck circumference (cm)"
-    chest="Chest circumference (cm)"
-    abdomen="Abdomen circumference (cm)"
-    hip="Hip circumference (cm)"
+data intro.fat;
+  infile fat;
+  input 
+    case
+    fat_brozek
+    fat_siri
+    dens
 </a:t>
             </a:r>
           </a:p>
@@ -7925,7 +7892,7 @@
             </a:pPr>
             <a:r>
               <a:rPr/>
-              <a:t>SAS Code: Part04. Add variable labels</a:t>
+              <a:t>SAS Code: Part03. Read in your data</a:t>
             </a:r>
           </a:p>
         </p:txBody>
@@ -7953,13 +7920,14 @@
                 <a:latin typeface="Courier"/>
               </a:rPr>
               <a:t>
-    thigh="Thigh circumference (cm)"
-    knee="Knee circumference (cm)"
-    ankle="Ankle circumference (cm)"
-    biceps="Extended biceps circumference (cm)"
-    forearm="Forearm circumference (cm)"
-    wrist="Wrist circumference (cm)";
-run;
+    age
+    wt
+    ht
+    bmi
+    ffw
+    neck
+    chest
+    abdomen
 </a:t>
             </a:r>
           </a:p>
@@ -8007,7 +7975,42 @@
             </a:pPr>
             <a:r>
               <a:rPr/>
-              <a:t>Chunk 5</a:t>
+              <a:t>SAS Code: Part03. Read in your data</a:t>
+            </a:r>
+          </a:p>
+        </p:txBody>
+      </p:sp>
+      <p:sp>
+        <p:nvSpPr>
+          <p:cNvPr id="3" name="Content Placeholder 2"/>
+          <p:cNvSpPr>
+            <a:spLocks noGrp="1"/>
+          </p:cNvSpPr>
+          <p:nvPr>
+            <p:ph idx="1"/>
+          </p:nvPr>
+        </p:nvSpPr>
+        <p:spPr/>
+        <p:txBody>
+          <a:bodyPr/>
+          <a:lstStyle/>
+          <a:p>
+            <a:pPr lvl="0" indent="0">
+              <a:buNone/>
+            </a:pPr>
+            <a:r>
+              <a:rPr>
+                <a:latin typeface="Courier"/>
+              </a:rPr>
+              <a:t>
+    hip
+    thigh
+    knee
+    ankle
+    biceps
+    forearm
+    wrist;
+</a:t>
             </a:r>
           </a:p>
         </p:txBody>
@@ -8054,41 +8057,7 @@
             </a:pPr>
             <a:r>
               <a:rPr/>
-              <a:t>SAS Code: Part05. Print a small piece of the data</a:t>
-            </a:r>
-          </a:p>
-        </p:txBody>
-      </p:sp>
-      <p:sp>
-        <p:nvSpPr>
-          <p:cNvPr id="3" name="Content Placeholder 2"/>
-          <p:cNvSpPr>
-            <a:spLocks noGrp="1"/>
-          </p:cNvSpPr>
-          <p:nvPr>
-            <p:ph idx="1"/>
-          </p:nvPr>
-        </p:nvSpPr>
-        <p:spPr/>
-        <p:txBody>
-          <a:bodyPr/>
-          <a:lstStyle/>
-          <a:p>
-            <a:pPr lvl="0" indent="0">
-              <a:buNone/>
-            </a:pPr>
-            <a:r>
-              <a:rPr>
-                <a:latin typeface="Courier"/>
-              </a:rPr>
-              <a:t>
-proc print
-    data=intro.fat(obs=10);
-  var case fat_brozek fat_siri dens age;
-  title1 "Ten rows and five columns";
-  title2 "of the fat data set";
-run;
-</a:t>
+              <a:t>Chunk 4</a:t>
             </a:r>
           </a:p>
         </p:txBody>
@@ -8135,7 +8104,7 @@
             </a:pPr>
             <a:r>
               <a:rPr/>
-              <a:t>SAS output: Part05. Print a small piece of the data</a:t>
+              <a:t>SAS Code: Part04. Add variable labels</a:t>
             </a:r>
           </a:p>
         </p:txBody>
@@ -8155,12 +8124,22 @@
           <a:bodyPr/>
           <a:lstStyle/>
           <a:p>
-            <a:pPr lvl="0" indent="0" marL="0">
-              <a:buNone/>
-            </a:pPr>
-            <a:r>
-              <a:rPr/>
-              <a:t>Figure 01</a:t>
+            <a:pPr lvl="0" indent="0">
+              <a:buNone/>
+            </a:pPr>
+            <a:r>
+              <a:rPr>
+                <a:latin typeface="Courier"/>
+              </a:rPr>
+              <a:t>
+label
+    case="Case number"
+    fat_brozek="Fat (Brozek's equation)"
+    fat_siri="Fat (Siri's equation)"
+    dens="Density"
+    age="Age (yrs)"
+    wt="Weight (lbs)"
+</a:t>
             </a:r>
           </a:p>
         </p:txBody>
@@ -8207,7 +8186,42 @@
             </a:pPr>
             <a:r>
               <a:rPr/>
-              <a:t>Chunk 6</a:t>
+              <a:t>SAS Code: Part04. Add variable labels</a:t>
+            </a:r>
+          </a:p>
+        </p:txBody>
+      </p:sp>
+      <p:sp>
+        <p:nvSpPr>
+          <p:cNvPr id="3" name="Content Placeholder 2"/>
+          <p:cNvSpPr>
+            <a:spLocks noGrp="1"/>
+          </p:cNvSpPr>
+          <p:nvPr>
+            <p:ph idx="1"/>
+          </p:nvPr>
+        </p:nvSpPr>
+        <p:spPr/>
+        <p:txBody>
+          <a:bodyPr/>
+          <a:lstStyle/>
+          <a:p>
+            <a:pPr lvl="0" indent="0">
+              <a:buNone/>
+            </a:pPr>
+            <a:r>
+              <a:rPr>
+                <a:latin typeface="Courier"/>
+              </a:rPr>
+              <a:t>
+    ht="Height (inches)"
+    bmi="Body mass index (kg/m^2)"
+    ffw="Fat Free Weight (lbs)"
+    neck="Neck circumference (cm)"
+    chest="Chest circumference (cm)"
+    abdomen="Abdomen circumference (cm)"
+    hip="Hip circumference (cm)"
+</a:t>
             </a:r>
           </a:p>
         </p:txBody>
@@ -8326,7 +8340,7 @@
             </a:pPr>
             <a:r>
               <a:rPr/>
-              <a:t>SAS Code: Part06. Calculate simple statistics for ht</a:t>
+              <a:t>SAS Code: Part04. Add variable labels</a:t>
             </a:r>
           </a:p>
         </p:txBody>
@@ -8354,12 +8368,12 @@
                 <a:latin typeface="Courier"/>
               </a:rPr>
               <a:t>
-proc means
-    n mean std min max
-    data=intro.fat;
-  var ht;
-  title1 "Descriptive statistics for ht";
-  title2 "Notice the unusual minimum";
+    thigh="Thigh circumference (cm)"
+    knee="Knee circumference (cm)"
+    ankle="Ankle circumference (cm)"
+    biceps="Biceps circumference (cm)"
+    forearm="Forearm circumference (cm)"
+    wrist="Wrist circumference (cm)";
 run;
 </a:t>
             </a:r>
@@ -8408,32 +8422,7 @@
             </a:pPr>
             <a:r>
               <a:rPr/>
-              <a:t>SAS output: Part06. Calculate simple statistics for ht</a:t>
-            </a:r>
-          </a:p>
-        </p:txBody>
-      </p:sp>
-      <p:sp>
-        <p:nvSpPr>
-          <p:cNvPr id="3" name="Content Placeholder 2"/>
-          <p:cNvSpPr>
-            <a:spLocks noGrp="1"/>
-          </p:cNvSpPr>
-          <p:nvPr>
-            <p:ph idx="1"/>
-          </p:nvPr>
-        </p:nvSpPr>
-        <p:spPr/>
-        <p:txBody>
-          <a:bodyPr/>
-          <a:lstStyle/>
-          <a:p>
-            <a:pPr lvl="0" indent="0" marL="0">
-              <a:buNone/>
-            </a:pPr>
-            <a:r>
-              <a:rPr/>
-              <a:t>Figure 02</a:t>
+              <a:t>Chunk 5</a:t>
             </a:r>
           </a:p>
         </p:txBody>
@@ -8480,7 +8469,41 @@
             </a:pPr>
             <a:r>
               <a:rPr/>
-              <a:t>Chunk 7</a:t>
+              <a:t>SAS Code: Part05. Print a small piece of the data</a:t>
+            </a:r>
+          </a:p>
+        </p:txBody>
+      </p:sp>
+      <p:sp>
+        <p:nvSpPr>
+          <p:cNvPr id="3" name="Content Placeholder 2"/>
+          <p:cNvSpPr>
+            <a:spLocks noGrp="1"/>
+          </p:cNvSpPr>
+          <p:nvPr>
+            <p:ph idx="1"/>
+          </p:nvPr>
+        </p:nvSpPr>
+        <p:spPr/>
+        <p:txBody>
+          <a:bodyPr/>
+          <a:lstStyle/>
+          <a:p>
+            <a:pPr lvl="0" indent="0">
+              <a:buNone/>
+            </a:pPr>
+            <a:r>
+              <a:rPr>
+                <a:latin typeface="Courier"/>
+              </a:rPr>
+              <a:t>
+proc print
+    data=intro.fat(obs=10);
+  var case fat_brozek fat_siri dens age;
+  title1 "Ten rows and five columns";
+  title2 "of the fat data set";
+run;
+</a:t>
             </a:r>
           </a:p>
         </p:txBody>
@@ -8527,7 +8550,7 @@
             </a:pPr>
             <a:r>
               <a:rPr/>
-              <a:t>SAS Code: Part07. Look at smallest value</a:t>
+              <a:t>SAS output: Part05. Print a small piece of the data</a:t>
             </a:r>
           </a:p>
         </p:txBody>
@@ -8547,19 +8570,12 @@
           <a:bodyPr/>
           <a:lstStyle/>
           <a:p>
-            <a:pPr lvl="0" indent="0">
-              <a:buNone/>
-            </a:pPr>
-            <a:r>
-              <a:rPr>
-                <a:latin typeface="Courier"/>
-              </a:rPr>
-              <a:t>
-proc sort
-    data=intro.fat;
-  by ht;
-run;
-</a:t>
+            <a:pPr lvl="0" indent="0" marL="0">
+              <a:buNone/>
+            </a:pPr>
+            <a:r>
+              <a:rPr/>
+              <a:t>Figure 01</a:t>
             </a:r>
           </a:p>
         </p:txBody>
@@ -8606,40 +8622,7 @@
             </a:pPr>
             <a:r>
               <a:rPr/>
-              <a:t>SAS Code: Part07. Look at smallest value</a:t>
-            </a:r>
-          </a:p>
-        </p:txBody>
-      </p:sp>
-      <p:sp>
-        <p:nvSpPr>
-          <p:cNvPr id="3" name="Content Placeholder 2"/>
-          <p:cNvSpPr>
-            <a:spLocks noGrp="1"/>
-          </p:cNvSpPr>
-          <p:nvPr>
-            <p:ph idx="1"/>
-          </p:nvPr>
-        </p:nvSpPr>
-        <p:spPr/>
-        <p:txBody>
-          <a:bodyPr/>
-          <a:lstStyle/>
-          <a:p>
-            <a:pPr lvl="0" indent="0">
-              <a:buNone/>
-            </a:pPr>
-            <a:r>
-              <a:rPr>
-                <a:latin typeface="Courier"/>
-              </a:rPr>
-              <a:t>
-proc print
-    data=intro.fat(obs=1);
-  title1 "The row with the smallest ht";
-  title2 "Note the inconsistency with wt";
-run;
-</a:t>
+              <a:t>Chunk 6</a:t>
             </a:r>
           </a:p>
         </p:txBody>
@@ -8686,7 +8669,7 @@
             </a:pPr>
             <a:r>
               <a:rPr/>
-              <a:t>SAS output: Part07. Look at smallest value</a:t>
+              <a:t>SAS Code: Part06. Calculate simple statistics for ht</a:t>
             </a:r>
           </a:p>
         </p:txBody>
@@ -8706,12 +8689,22 @@
           <a:bodyPr/>
           <a:lstStyle/>
           <a:p>
-            <a:pPr lvl="0" indent="0" marL="0">
-              <a:buNone/>
-            </a:pPr>
-            <a:r>
-              <a:rPr/>
-              <a:t>Figure 03</a:t>
+            <a:pPr lvl="0" indent="0">
+              <a:buNone/>
+            </a:pPr>
+            <a:r>
+              <a:rPr>
+                <a:latin typeface="Courier"/>
+              </a:rPr>
+              <a:t>
+proc means
+    n mean std min max
+    data=intro.fat;
+  var ht;
+  title1 "Descriptive statistics for ht";
+  title2 "Notice the unusual minimum";
+run;
+</a:t>
             </a:r>
           </a:p>
         </p:txBody>
@@ -8758,7 +8751,32 @@
             </a:pPr>
             <a:r>
               <a:rPr/>
-              <a:t>Chunk 8</a:t>
+              <a:t>SAS output: Part06. Calculate simple statistics for ht</a:t>
+            </a:r>
+          </a:p>
+        </p:txBody>
+      </p:sp>
+      <p:sp>
+        <p:nvSpPr>
+          <p:cNvPr id="3" name="Content Placeholder 2"/>
+          <p:cNvSpPr>
+            <a:spLocks noGrp="1"/>
+          </p:cNvSpPr>
+          <p:nvPr>
+            <p:ph idx="1"/>
+          </p:nvPr>
+        </p:nvSpPr>
+        <p:spPr/>
+        <p:txBody>
+          <a:bodyPr/>
+          <a:lstStyle/>
+          <a:p>
+            <a:pPr lvl="0" indent="0" marL="0">
+              <a:buNone/>
+            </a:pPr>
+            <a:r>
+              <a:rPr/>
+              <a:t>Figure 02</a:t>
             </a:r>
           </a:p>
         </p:txBody>
@@ -8805,39 +8823,7 @@
             </a:pPr>
             <a:r>
               <a:rPr/>
-              <a:t>SAS Code: Part08. Look at the largest value</a:t>
-            </a:r>
-          </a:p>
-        </p:txBody>
-      </p:sp>
-      <p:sp>
-        <p:nvSpPr>
-          <p:cNvPr id="3" name="Content Placeholder 2"/>
-          <p:cNvSpPr>
-            <a:spLocks noGrp="1"/>
-          </p:cNvSpPr>
-          <p:nvPr>
-            <p:ph idx="1"/>
-          </p:nvPr>
-        </p:nvSpPr>
-        <p:spPr/>
-        <p:txBody>
-          <a:bodyPr/>
-          <a:lstStyle/>
-          <a:p>
-            <a:pPr lvl="0" indent="0">
-              <a:buNone/>
-            </a:pPr>
-            <a:r>
-              <a:rPr>
-                <a:latin typeface="Courier"/>
-              </a:rPr>
-              <a:t>
-proc sort
-    data=intro.fat;
-  by descending ht;
-run;
-</a:t>
+              <a:t>Chunk 7</a:t>
             </a:r>
           </a:p>
         </p:txBody>
@@ -8884,7 +8870,7 @@
             </a:pPr>
             <a:r>
               <a:rPr/>
-              <a:t>SAS Code: Part08. Look at the largest value</a:t>
+              <a:t>SAS Code: Part07. Look at smallest value</a:t>
             </a:r>
           </a:p>
         </p:txBody>
@@ -8912,10 +8898,9 @@
                 <a:latin typeface="Courier"/>
               </a:rPr>
               <a:t>
-proc print
-    data=intro.fat(obs=1);
-  title1 "The row with the largest ht";
-  title2 "This seems quite normal to me";
+proc sort
+    data=intro.fat;
+  by ht;
 run;
 </a:t>
             </a:r>
@@ -8964,7 +8949,7 @@
             </a:pPr>
             <a:r>
               <a:rPr/>
-              <a:t>SAS output: Part08. Look at the largest value</a:t>
+              <a:t>SAS Code: Part07. Look at smallest value</a:t>
             </a:r>
           </a:p>
         </p:txBody>
@@ -8984,12 +8969,20 @@
           <a:bodyPr/>
           <a:lstStyle/>
           <a:p>
-            <a:pPr lvl="0" indent="0" marL="0">
-              <a:buNone/>
-            </a:pPr>
-            <a:r>
-              <a:rPr/>
-              <a:t>Figure 04</a:t>
+            <a:pPr lvl="0" indent="0">
+              <a:buNone/>
+            </a:pPr>
+            <a:r>
+              <a:rPr>
+                <a:latin typeface="Courier"/>
+              </a:rPr>
+              <a:t>
+proc print
+    data=intro.fat(obs=1);
+  title1 "The row with the smallest ht";
+  title2 "Note the inconsistency with wt";
+run;
+</a:t>
             </a:r>
           </a:p>
         </p:txBody>
@@ -9064,41 +9057,6 @@
               <a:t>1, 1, 1, 2, 2, 2, 3, 3, 3, 3, 3, 4, 4, 4, 4, 4, 5, 5, 5, 5, 6, 6, 6, 6, 7, 7, 7, 7, 7, 7, 8, 8, 8, 8, 8, 8, 9, 9, 9, 10, 10, 10, 11, 11, 11, 11, 12, 12, 12, 12, 12, 13, 13, 13, 13, 13, 13, 14, 14, 14, 14, 14, 15, 15, 15, 15, 15, 16, 16, 16, 16, 16, 17, 17, 17, 17, 17, 17, 17, 18, 18, 18, 18, 18, 18, 18, 19, 19, 19, 20, 20, 20, 20, 20, 21, 21, 21, 21, 21, 22, 22, 22, 22, 22, 23, 23, 23, 23, 23</a:t>
             </a:r>
           </a:p>
-          <a:p>
-            <a:pPr lvl="0" indent="0">
-              <a:buNone/>
-            </a:pPr>
-            <a:r>
-              <a:rPr>
-                <a:latin typeface="Courier"/>
-              </a:rPr>
-              <a:t>i </a:t>
-            </a:r>
-            <a:r>
-              <a:rPr>
-                <a:solidFill>
-                  <a:srgbClr val="007020"/>
-                </a:solidFill>
-                <a:latin typeface="Courier"/>
-              </a:rPr>
-              <a:t>&lt;-</a:t>
-            </a:r>
-            <a:r>
-              <a:rPr>
-                <a:latin typeface="Courier"/>
-              </a:rPr>
-              <a:t> </a:t>
-            </a:r>
-            <a:r>
-              <a:rPr>
-                <a:solidFill>
-                  <a:srgbClr val="40A070"/>
-                </a:solidFill>
-                <a:latin typeface="Courier"/>
-              </a:rPr>
-              <a:t>0</a:t>
-            </a:r>
-          </a:p>
         </p:txBody>
       </p:sp>
     </p:spTree>
@@ -9143,7 +9101,32 @@
             </a:pPr>
             <a:r>
               <a:rPr/>
-              <a:t>Chunk 9</a:t>
+              <a:t>SAS output: Part07. Look at smallest value</a:t>
+            </a:r>
+          </a:p>
+        </p:txBody>
+      </p:sp>
+      <p:sp>
+        <p:nvSpPr>
+          <p:cNvPr id="3" name="Content Placeholder 2"/>
+          <p:cNvSpPr>
+            <a:spLocks noGrp="1"/>
+          </p:cNvSpPr>
+          <p:nvPr>
+            <p:ph idx="1"/>
+          </p:nvPr>
+        </p:nvSpPr>
+        <p:spPr/>
+        <p:txBody>
+          <a:bodyPr/>
+          <a:lstStyle/>
+          <a:p>
+            <a:pPr lvl="0" indent="0" marL="0">
+              <a:buNone/>
+            </a:pPr>
+            <a:r>
+              <a:rPr/>
+              <a:t>Figure 03</a:t>
             </a:r>
           </a:p>
         </p:txBody>
@@ -9190,39 +9173,7 @@
             </a:pPr>
             <a:r>
               <a:rPr/>
-              <a:t>SAS Code: Part09. Removing the entire row</a:t>
-            </a:r>
-          </a:p>
-        </p:txBody>
-      </p:sp>
-      <p:sp>
-        <p:nvSpPr>
-          <p:cNvPr id="3" name="Content Placeholder 2"/>
-          <p:cNvSpPr>
-            <a:spLocks noGrp="1"/>
-          </p:cNvSpPr>
-          <p:nvPr>
-            <p:ph idx="1"/>
-          </p:nvPr>
-        </p:nvSpPr>
-        <p:spPr/>
-        <p:txBody>
-          <a:bodyPr/>
-          <a:lstStyle/>
-          <a:p>
-            <a:pPr lvl="0" indent="0">
-              <a:buNone/>
-            </a:pPr>
-            <a:r>
-              <a:rPr>
-                <a:latin typeface="Courier"/>
-              </a:rPr>
-              <a:t>
-data intro.fat1;
-  set intro.fat;
-  if ht &gt; 29.5;
-run;
-</a:t>
+              <a:t>Chunk 8</a:t>
             </a:r>
           </a:p>
         </p:txBody>
@@ -9269,7 +9220,39 @@
             </a:pPr>
             <a:r>
               <a:rPr/>
-              <a:t>Chunk 10</a:t>
+              <a:t>SAS Code: Part08. Look at the largest value</a:t>
+            </a:r>
+          </a:p>
+        </p:txBody>
+      </p:sp>
+      <p:sp>
+        <p:nvSpPr>
+          <p:cNvPr id="3" name="Content Placeholder 2"/>
+          <p:cNvSpPr>
+            <a:spLocks noGrp="1"/>
+          </p:cNvSpPr>
+          <p:nvPr>
+            <p:ph idx="1"/>
+          </p:nvPr>
+        </p:nvSpPr>
+        <p:spPr/>
+        <p:txBody>
+          <a:bodyPr/>
+          <a:lstStyle/>
+          <a:p>
+            <a:pPr lvl="0" indent="0">
+              <a:buNone/>
+            </a:pPr>
+            <a:r>
+              <a:rPr>
+                <a:latin typeface="Courier"/>
+              </a:rPr>
+              <a:t>
+proc sort
+    data=intro.fat;
+  by descending ht;
+run;
+</a:t>
             </a:r>
           </a:p>
         </p:txBody>
@@ -9316,7 +9299,7 @@
             </a:pPr>
             <a:r>
               <a:rPr/>
-              <a:t>SAS Code: Part10. Converting the outlier to a missing value</a:t>
+              <a:t>SAS Code: Part08. Look at the largest value</a:t>
             </a:r>
           </a:p>
         </p:txBody>
@@ -9344,9 +9327,10 @@
                 <a:latin typeface="Courier"/>
               </a:rPr>
               <a:t>
-data intro.fat2;
-  set intro.fat;
-  if ht=29.5 then ht=.;
+proc print
+    data=intro.fat(obs=1);
+  title1 "The row with the largest ht";
+  title2 "This seems quite normal to me";
 run;
 </a:t>
             </a:r>
@@ -9395,7 +9379,32 @@
             </a:pPr>
             <a:r>
               <a:rPr/>
-              <a:t>Chunk 11</a:t>
+              <a:t>SAS output: Part08. Look at the largest value</a:t>
+            </a:r>
+          </a:p>
+        </p:txBody>
+      </p:sp>
+      <p:sp>
+        <p:nvSpPr>
+          <p:cNvPr id="3" name="Content Placeholder 2"/>
+          <p:cNvSpPr>
+            <a:spLocks noGrp="1"/>
+          </p:cNvSpPr>
+          <p:nvPr>
+            <p:ph idx="1"/>
+          </p:nvPr>
+        </p:nvSpPr>
+        <p:spPr/>
+        <p:txBody>
+          <a:bodyPr/>
+          <a:lstStyle/>
+          <a:p>
+            <a:pPr lvl="0" indent="0" marL="0">
+              <a:buNone/>
+            </a:pPr>
+            <a:r>
+              <a:rPr/>
+              <a:t>Figure 04</a:t>
             </a:r>
           </a:p>
         </p:txBody>
@@ -9442,40 +9451,7 @@
             </a:pPr>
             <a:r>
               <a:rPr/>
-              <a:t>SAS Code: Part11. Faulty approach for filtering out negative values</a:t>
-            </a:r>
-          </a:p>
-        </p:txBody>
-      </p:sp>
-      <p:sp>
-        <p:nvSpPr>
-          <p:cNvPr id="3" name="Content Placeholder 2"/>
-          <p:cNvSpPr>
-            <a:spLocks noGrp="1"/>
-          </p:cNvSpPr>
-          <p:nvPr>
-            <p:ph idx="1"/>
-          </p:nvPr>
-        </p:nvSpPr>
-        <p:spPr/>
-        <p:txBody>
-          <a:bodyPr/>
-          <a:lstStyle/>
-          <a:p>
-            <a:pPr lvl="0" indent="0">
-              <a:buNone/>
-            </a:pPr>
-            <a:r>
-              <a:rPr>
-                <a:latin typeface="Courier"/>
-              </a:rPr>
-              <a:t>
-proc print
-    data=intro.fat2;
-  where ht &lt; 0;
-  title1 "ht &lt; 0 will include ht = .";
-run;
-</a:t>
+              <a:t>Chunk 9</a:t>
             </a:r>
           </a:p>
         </p:txBody>
@@ -9522,7 +9498,7 @@
             </a:pPr>
             <a:r>
               <a:rPr/>
-              <a:t>SAS output: Part11. Faulty approach for filtering out negative values</a:t>
+              <a:t>SAS Code: Part09. Removing the entire row</a:t>
             </a:r>
           </a:p>
         </p:txBody>
@@ -9542,12 +9518,19 @@
           <a:bodyPr/>
           <a:lstStyle/>
           <a:p>
-            <a:pPr lvl="0" indent="0" marL="0">
-              <a:buNone/>
-            </a:pPr>
-            <a:r>
-              <a:rPr/>
-              <a:t>Figure 05</a:t>
+            <a:pPr lvl="0" indent="0">
+              <a:buNone/>
+            </a:pPr>
+            <a:r>
+              <a:rPr>
+                <a:latin typeface="Courier"/>
+              </a:rPr>
+              <a:t>
+data intro.fat1;
+  set intro.fat;
+  if ht &gt; 29.5;
+run;
+</a:t>
             </a:r>
           </a:p>
         </p:txBody>
@@ -9594,7 +9577,7 @@
             </a:pPr>
             <a:r>
               <a:rPr/>
-              <a:t>Chunk 12</a:t>
+              <a:t>Chunk 10</a:t>
             </a:r>
           </a:p>
         </p:txBody>
@@ -9641,7 +9624,7 @@
             </a:pPr>
             <a:r>
               <a:rPr/>
-              <a:t>SAS Code: Part12. Counting missing values</a:t>
+              <a:t>SAS Code: Part10. Converting the outlier to a missing value</a:t>
             </a:r>
           </a:p>
         </p:txBody>
@@ -9669,11 +9652,9 @@
                 <a:latin typeface="Courier"/>
               </a:rPr>
               <a:t>
-proc means
-    n nmiss mean std min max
-    data=intro.fat2;
-  var ht;
-  title "Using the nmiss statistic";
+data intro.fat2;
+  set intro.fat;
+  if ht=29.5 then ht=.;
 run;
 </a:t>
             </a:r>
@@ -9722,32 +9703,7 @@
             </a:pPr>
             <a:r>
               <a:rPr/>
-              <a:t>SAS output: Part12. Counting missing values</a:t>
-            </a:r>
-          </a:p>
-        </p:txBody>
-      </p:sp>
-      <p:sp>
-        <p:nvSpPr>
-          <p:cNvPr id="3" name="Content Placeholder 2"/>
-          <p:cNvSpPr>
-            <a:spLocks noGrp="1"/>
-          </p:cNvSpPr>
-          <p:nvPr>
-            <p:ph idx="1"/>
-          </p:nvPr>
-        </p:nvSpPr>
-        <p:spPr/>
-        <p:txBody>
-          <a:bodyPr/>
-          <a:lstStyle/>
-          <a:p>
-            <a:pPr lvl="0" indent="0" marL="0">
-              <a:buNone/>
-            </a:pPr>
-            <a:r>
-              <a:rPr/>
-              <a:t>Figure 06</a:t>
+              <a:t>Chunk 11</a:t>
             </a:r>
           </a:p>
         </p:txBody>
@@ -9794,7 +9750,38 @@
             </a:pPr>
             <a:r>
               <a:rPr/>
-              <a:t>Chunk 1</a:t>
+              <a:t>QC check</a:t>
+            </a:r>
+          </a:p>
+        </p:txBody>
+      </p:sp>
+      <p:sp>
+        <p:nvSpPr>
+          <p:cNvPr id="3" name="Content Placeholder 2"/>
+          <p:cNvSpPr>
+            <a:spLocks noGrp="1"/>
+          </p:cNvSpPr>
+          <p:nvPr>
+            <p:ph idx="1"/>
+          </p:nvPr>
+        </p:nvSpPr>
+        <p:spPr/>
+        <p:txBody>
+          <a:bodyPr/>
+          <a:lstStyle/>
+          <a:p>
+            <a:pPr lvl="0" indent="0">
+              <a:buNone/>
+            </a:pPr>
+            <a:r>
+              <a:rPr>
+                <a:latin typeface="Courier"/>
+              </a:rPr>
+              <a:t>## [1] "&lt;!---Part01. Documentation header---&gt;"                    
+## [2] "&lt;!---Part02. Tell SAS where to find and store things.---&gt;"
+## [3] "&lt;!---Part03. Read in your data---&gt;"                       
+## [4] "&lt;!---Part04. Add variable labels---&gt;"                     
+## [5] "&lt;!---Part05. Print a small piece of the data---&gt;"</a:t>
             </a:r>
           </a:p>
         </p:txBody>
@@ -9841,7 +9828,40 @@
             </a:pPr>
             <a:r>
               <a:rPr/>
-              <a:t>Chunk 13</a:t>
+              <a:t>SAS Code: Part11. Faulty approach for filtering out negative values</a:t>
+            </a:r>
+          </a:p>
+        </p:txBody>
+      </p:sp>
+      <p:sp>
+        <p:nvSpPr>
+          <p:cNvPr id="3" name="Content Placeholder 2"/>
+          <p:cNvSpPr>
+            <a:spLocks noGrp="1"/>
+          </p:cNvSpPr>
+          <p:nvPr>
+            <p:ph idx="1"/>
+          </p:nvPr>
+        </p:nvSpPr>
+        <p:spPr/>
+        <p:txBody>
+          <a:bodyPr/>
+          <a:lstStyle/>
+          <a:p>
+            <a:pPr lvl="0" indent="0">
+              <a:buNone/>
+            </a:pPr>
+            <a:r>
+              <a:rPr>
+                <a:latin typeface="Courier"/>
+              </a:rPr>
+              <a:t>
+proc print
+    data=intro.fat2;
+  where ht &lt; 0;
+  title1 "ht &lt; 0 will include ht = .";
+run;
+</a:t>
             </a:r>
           </a:p>
         </p:txBody>
@@ -9888,7 +9908,7 @@
             </a:pPr>
             <a:r>
               <a:rPr/>
-              <a:t>SAS Code: Part13. Simple transformations</a:t>
+              <a:t>SAS output: Part11. Faulty approach for filtering out negative values</a:t>
             </a:r>
           </a:p>
         </p:txBody>
@@ -9908,20 +9928,12 @@
           <a:bodyPr/>
           <a:lstStyle/>
           <a:p>
-            <a:pPr lvl="0" indent="0">
-              <a:buNone/>
-            </a:pPr>
-            <a:r>
-              <a:rPr>
-                <a:latin typeface="Courier"/>
-              </a:rPr>
-              <a:t>
-data converted_units;
-  set intro.fat2;
-  ht_cm = ht * 2.54;
-  wt_kg = wt / 2.2; 
-run;
-</a:t>
+            <a:pPr lvl="0" indent="0" marL="0">
+              <a:buNone/>
+            </a:pPr>
+            <a:r>
+              <a:rPr/>
+              <a:t>Figure 05</a:t>
             </a:r>
           </a:p>
         </p:txBody>
@@ -9968,40 +9980,7 @@
             </a:pPr>
             <a:r>
               <a:rPr/>
-              <a:t>SAS Code: Part13. Simple transformations</a:t>
-            </a:r>
-          </a:p>
-        </p:txBody>
-      </p:sp>
-      <p:sp>
-        <p:nvSpPr>
-          <p:cNvPr id="3" name="Content Placeholder 2"/>
-          <p:cNvSpPr>
-            <a:spLocks noGrp="1"/>
-          </p:cNvSpPr>
-          <p:nvPr>
-            <p:ph idx="1"/>
-          </p:nvPr>
-        </p:nvSpPr>
-        <p:spPr/>
-        <p:txBody>
-          <a:bodyPr/>
-          <a:lstStyle/>
-          <a:p>
-            <a:pPr lvl="0" indent="0">
-              <a:buNone/>
-            </a:pPr>
-            <a:r>
-              <a:rPr>
-                <a:latin typeface="Courier"/>
-              </a:rPr>
-              <a:t>
-proc print 
-    data=converted_units(obs=10);
-  var ht ht_cm wt wt_kg;
-  title1 "Original and converted units";
-run;
-</a:t>
+              <a:t>Chunk 12</a:t>
             </a:r>
           </a:p>
         </p:txBody>
@@ -10048,7 +10027,7 @@
             </a:pPr>
             <a:r>
               <a:rPr/>
-              <a:t>SAS output: Part13. Simple transformations</a:t>
+              <a:t>SAS Code: Part12. Counting missing values</a:t>
             </a:r>
           </a:p>
         </p:txBody>
@@ -10068,12 +10047,21 @@
           <a:bodyPr/>
           <a:lstStyle/>
           <a:p>
-            <a:pPr lvl="0" indent="0" marL="0">
-              <a:buNone/>
-            </a:pPr>
-            <a:r>
-              <a:rPr/>
-              <a:t>Figure 07</a:t>
+            <a:pPr lvl="0" indent="0">
+              <a:buNone/>
+            </a:pPr>
+            <a:r>
+              <a:rPr>
+                <a:latin typeface="Courier"/>
+              </a:rPr>
+              <a:t>
+proc means
+    n nmiss mean std min max
+    data=intro.fat2;
+  var ht;
+  title "Using the nmiss statistic";
+run;
+</a:t>
             </a:r>
           </a:p>
         </p:txBody>
@@ -10120,7 +10108,32 @@
             </a:pPr>
             <a:r>
               <a:rPr/>
-              <a:t>Chunk 14</a:t>
+              <a:t>SAS output: Part12. Counting missing values</a:t>
+            </a:r>
+          </a:p>
+        </p:txBody>
+      </p:sp>
+      <p:sp>
+        <p:nvSpPr>
+          <p:cNvPr id="3" name="Content Placeholder 2"/>
+          <p:cNvSpPr>
+            <a:spLocks noGrp="1"/>
+          </p:cNvSpPr>
+          <p:nvPr>
+            <p:ph idx="1"/>
+          </p:nvPr>
+        </p:nvSpPr>
+        <p:spPr/>
+        <p:txBody>
+          <a:bodyPr/>
+          <a:lstStyle/>
+          <a:p>
+            <a:pPr lvl="0" indent="0" marL="0">
+              <a:buNone/>
+            </a:pPr>
+            <a:r>
+              <a:rPr/>
+              <a:t>Figure 06</a:t>
             </a:r>
           </a:p>
         </p:txBody>
@@ -10167,40 +10180,7 @@
             </a:pPr>
             <a:r>
               <a:rPr/>
-              <a:t>SAS Code: Part14. Display a histogram</a:t>
-            </a:r>
-          </a:p>
-        </p:txBody>
-      </p:sp>
-      <p:sp>
-        <p:nvSpPr>
-          <p:cNvPr id="3" name="Content Placeholder 2"/>
-          <p:cNvSpPr>
-            <a:spLocks noGrp="1"/>
-          </p:cNvSpPr>
-          <p:nvPr>
-            <p:ph idx="1"/>
-          </p:nvPr>
-        </p:nvSpPr>
-        <p:spPr/>
-        <p:txBody>
-          <a:bodyPr/>
-          <a:lstStyle/>
-          <a:p>
-            <a:pPr lvl="0" indent="0">
-              <a:buNone/>
-            </a:pPr>
-            <a:r>
-              <a:rPr>
-                <a:latin typeface="Courier"/>
-              </a:rPr>
-              <a:t>
-proc sgplot
-    data=intro.fat2;
-  histogram ht;
-  title "Histogram with default bins";
-run;
-</a:t>
+              <a:t>Chunk 13</a:t>
             </a:r>
           </a:p>
         </p:txBody>
@@ -10247,7 +10227,7 @@
             </a:pPr>
             <a:r>
               <a:rPr/>
-              <a:t>SAS output: Part14. Display a histogram</a:t>
+              <a:t>SAS Code: Part13. Simple transformations</a:t>
             </a:r>
           </a:p>
         </p:txBody>
@@ -10267,12 +10247,20 @@
           <a:bodyPr/>
           <a:lstStyle/>
           <a:p>
-            <a:pPr lvl="0" indent="0" marL="0">
-              <a:buNone/>
-            </a:pPr>
-            <a:r>
-              <a:rPr/>
-              <a:t>Figure 08</a:t>
+            <a:pPr lvl="0" indent="0">
+              <a:buNone/>
+            </a:pPr>
+            <a:r>
+              <a:rPr>
+                <a:latin typeface="Courier"/>
+              </a:rPr>
+              <a:t>
+data converted_units;
+  set intro.fat2;
+  ht_cm = ht * 2.54;
+  wt_kg = wt / 2.2; 
+run;
+</a:t>
             </a:r>
           </a:p>
         </p:txBody>
@@ -10319,7 +10307,40 @@
             </a:pPr>
             <a:r>
               <a:rPr/>
-              <a:t>Chunk 15</a:t>
+              <a:t>SAS Code: Part13. Simple transformations</a:t>
+            </a:r>
+          </a:p>
+        </p:txBody>
+      </p:sp>
+      <p:sp>
+        <p:nvSpPr>
+          <p:cNvPr id="3" name="Content Placeholder 2"/>
+          <p:cNvSpPr>
+            <a:spLocks noGrp="1"/>
+          </p:cNvSpPr>
+          <p:nvPr>
+            <p:ph idx="1"/>
+          </p:nvPr>
+        </p:nvSpPr>
+        <p:spPr/>
+        <p:txBody>
+          <a:bodyPr/>
+          <a:lstStyle/>
+          <a:p>
+            <a:pPr lvl="0" indent="0">
+              <a:buNone/>
+            </a:pPr>
+            <a:r>
+              <a:rPr>
+                <a:latin typeface="Courier"/>
+              </a:rPr>
+              <a:t>
+proc print 
+    data=converted_units(obs=10);
+  var ht ht_cm wt wt_kg;
+  title1 "Original and converted units";
+run;
+</a:t>
             </a:r>
           </a:p>
         </p:txBody>
@@ -10366,7 +10387,7 @@
             </a:pPr>
             <a:r>
               <a:rPr/>
-              <a:t>SAS Code: Part15. Revised histogram with narrow bins</a:t>
+              <a:t>SAS output: Part13. Simple transformations</a:t>
             </a:r>
           </a:p>
         </p:txBody>
@@ -10386,20 +10407,12 @@
           <a:bodyPr/>
           <a:lstStyle/>
           <a:p>
-            <a:pPr lvl="0" indent="0">
-              <a:buNone/>
-            </a:pPr>
-            <a:r>
-              <a:rPr>
-                <a:latin typeface="Courier"/>
-              </a:rPr>
-              <a:t>
-proc sgplot
-    data=intro.fat2;
-  histogram ht / binstart=60 binwidth=1;
-  title "Histogram with narrow bins";
-run;
-</a:t>
+            <a:pPr lvl="0" indent="0" marL="0">
+              <a:buNone/>
+            </a:pPr>
+            <a:r>
+              <a:rPr/>
+              <a:t>Figure 07</a:t>
             </a:r>
           </a:p>
         </p:txBody>
@@ -10446,32 +10459,7 @@
             </a:pPr>
             <a:r>
               <a:rPr/>
-              <a:t>SAS output: Part15. Revised histogram with narrow bins</a:t>
-            </a:r>
-          </a:p>
-        </p:txBody>
-      </p:sp>
-      <p:sp>
-        <p:nvSpPr>
-          <p:cNvPr id="3" name="Content Placeholder 2"/>
-          <p:cNvSpPr>
-            <a:spLocks noGrp="1"/>
-          </p:cNvSpPr>
-          <p:nvPr>
-            <p:ph idx="1"/>
-          </p:nvPr>
-        </p:nvSpPr>
-        <p:spPr/>
-        <p:txBody>
-          <a:bodyPr/>
-          <a:lstStyle/>
-          <a:p>
-            <a:pPr lvl="0" indent="0" marL="0">
-              <a:buNone/>
-            </a:pPr>
-            <a:r>
-              <a:rPr/>
-              <a:t>Figure 09</a:t>
+              <a:t>Chunk 14</a:t>
             </a:r>
           </a:p>
         </p:txBody>
@@ -10518,7 +10506,7 @@
             </a:pPr>
             <a:r>
               <a:rPr/>
-              <a:t>SAS Code: Part01. Documentation header</a:t>
+              <a:t>QC check</a:t>
             </a:r>
           </a:p>
         </p:txBody>
@@ -10545,14 +10533,11 @@
               <a:rPr>
                 <a:latin typeface="Courier"/>
               </a:rPr>
-              <a:t>
-* 5507-02-simon-continuous-variables.sas
-* author: Steve Simon
-* date: created 2021-05-30
-* purpose: to work with continuous variables
-* license: public domain;
-options papersize=(6 4); 
-</a:t>
+              <a:t>## [1] "&lt;!---Part06. Calculate simple statistics for ht---&gt;"       
+## [2] "&lt;!---Part07. Look at smallest value---&gt;"                   
+## [3] "&lt;!---Part08. Look at the largest value---&gt;"                
+## [4] "&lt;!---Part09. Removing the entire row---&gt;"                  
+## [5] "&lt;!---Part10. Converting the outlier to a missing value---&gt;"</a:t>
             </a:r>
           </a:p>
         </p:txBody>
@@ -10599,7 +10584,40 @@
             </a:pPr>
             <a:r>
               <a:rPr/>
-              <a:t>Chunk 16</a:t>
+              <a:t>SAS Code: Part14. Display a histogram</a:t>
+            </a:r>
+          </a:p>
+        </p:txBody>
+      </p:sp>
+      <p:sp>
+        <p:nvSpPr>
+          <p:cNvPr id="3" name="Content Placeholder 2"/>
+          <p:cNvSpPr>
+            <a:spLocks noGrp="1"/>
+          </p:cNvSpPr>
+          <p:nvPr>
+            <p:ph idx="1"/>
+          </p:nvPr>
+        </p:nvSpPr>
+        <p:spPr/>
+        <p:txBody>
+          <a:bodyPr/>
+          <a:lstStyle/>
+          <a:p>
+            <a:pPr lvl="0" indent="0">
+              <a:buNone/>
+            </a:pPr>
+            <a:r>
+              <a:rPr>
+                <a:latin typeface="Courier"/>
+              </a:rPr>
+              <a:t>
+proc sgplot
+    data=intro.fat2;
+  histogram ht;
+  title "Histogram with default bins";
+run;
+</a:t>
             </a:r>
           </a:p>
         </p:txBody>
@@ -10646,7 +10664,7 @@
             </a:pPr>
             <a:r>
               <a:rPr/>
-              <a:t>SAS Code: Part16. Revised histogram with wide bins</a:t>
+              <a:t>SAS output: Part14. Display a histogram</a:t>
             </a:r>
           </a:p>
         </p:txBody>
@@ -10666,20 +10684,12 @@
           <a:bodyPr/>
           <a:lstStyle/>
           <a:p>
-            <a:pPr lvl="0" indent="0">
-              <a:buNone/>
-            </a:pPr>
-            <a:r>
-              <a:rPr>
-                <a:latin typeface="Courier"/>
-              </a:rPr>
-              <a:t>
-proc sgplot
-    data=intro.fat2;
-  histogram ht / binstart=60 binwidth=5;
-  title "Histogram with wide bins";
-run;
-</a:t>
+            <a:pPr lvl="0" indent="0" marL="0">
+              <a:buNone/>
+            </a:pPr>
+            <a:r>
+              <a:rPr/>
+              <a:t>Figure 08</a:t>
             </a:r>
           </a:p>
         </p:txBody>
@@ -10726,32 +10736,7 @@
             </a:pPr>
             <a:r>
               <a:rPr/>
-              <a:t>SAS output: Part16. Revised histogram with wide bins</a:t>
-            </a:r>
-          </a:p>
-        </p:txBody>
-      </p:sp>
-      <p:sp>
-        <p:nvSpPr>
-          <p:cNvPr id="3" name="Content Placeholder 2"/>
-          <p:cNvSpPr>
-            <a:spLocks noGrp="1"/>
-          </p:cNvSpPr>
-          <p:nvPr>
-            <p:ph idx="1"/>
-          </p:nvPr>
-        </p:nvSpPr>
-        <p:spPr/>
-        <p:txBody>
-          <a:bodyPr/>
-          <a:lstStyle/>
-          <a:p>
-            <a:pPr lvl="0" indent="0" marL="0">
-              <a:buNone/>
-            </a:pPr>
-            <a:r>
-              <a:rPr/>
-              <a:t>Figure 10</a:t>
+              <a:t>Chunk 15</a:t>
             </a:r>
           </a:p>
         </p:txBody>
@@ -10798,7 +10783,40 @@
             </a:pPr>
             <a:r>
               <a:rPr/>
-              <a:t>Chunk 17</a:t>
+              <a:t>SAS Code: Part15. Revised histogram with narrow bins</a:t>
+            </a:r>
+          </a:p>
+        </p:txBody>
+      </p:sp>
+      <p:sp>
+        <p:nvSpPr>
+          <p:cNvPr id="3" name="Content Placeholder 2"/>
+          <p:cNvSpPr>
+            <a:spLocks noGrp="1"/>
+          </p:cNvSpPr>
+          <p:nvPr>
+            <p:ph idx="1"/>
+          </p:nvPr>
+        </p:nvSpPr>
+        <p:spPr/>
+        <p:txBody>
+          <a:bodyPr/>
+          <a:lstStyle/>
+          <a:p>
+            <a:pPr lvl="0" indent="0">
+              <a:buNone/>
+            </a:pPr>
+            <a:r>
+              <a:rPr>
+                <a:latin typeface="Courier"/>
+              </a:rPr>
+              <a:t>
+proc sgplot
+    data=intro.fat2;
+  histogram ht / binstart=60 binwidth=1;
+  title "Histogram with narrow bins";
+run;
+</a:t>
             </a:r>
           </a:p>
         </p:txBody>
@@ -10845,7 +10863,7 @@
             </a:pPr>
             <a:r>
               <a:rPr/>
-              <a:t>SAS Code: Part17. Calculate correlations</a:t>
+              <a:t>SAS output: Part15. Revised histogram with narrow bins</a:t>
             </a:r>
           </a:p>
         </p:txBody>
@@ -10865,22 +10883,12 @@
           <a:bodyPr/>
           <a:lstStyle/>
           <a:p>
-            <a:pPr lvl="0" indent="0">
-              <a:buNone/>
-            </a:pPr>
-            <a:r>
-              <a:rPr>
-                <a:latin typeface="Courier"/>
-              </a:rPr>
-              <a:t>
-proc corr
-    data=intro.fat2
-    noprob nosimple;
-  var fat_brozek fat_siri;
-  with neck -- wrist;
-  title "Correlation matrix";
-run;
-</a:t>
+            <a:pPr lvl="0" indent="0" marL="0">
+              <a:buNone/>
+            </a:pPr>
+            <a:r>
+              <a:rPr/>
+              <a:t>Figure 09</a:t>
             </a:r>
           </a:p>
         </p:txBody>
@@ -10927,32 +10935,7 @@
             </a:pPr>
             <a:r>
               <a:rPr/>
-              <a:t>SAS output: Part17. Calculate correlations</a:t>
-            </a:r>
-          </a:p>
-        </p:txBody>
-      </p:sp>
-      <p:sp>
-        <p:nvSpPr>
-          <p:cNvPr id="3" name="Content Placeholder 2"/>
-          <p:cNvSpPr>
-            <a:spLocks noGrp="1"/>
-          </p:cNvSpPr>
-          <p:nvPr>
-            <p:ph idx="1"/>
-          </p:nvPr>
-        </p:nvSpPr>
-        <p:spPr/>
-        <p:txBody>
-          <a:bodyPr/>
-          <a:lstStyle/>
-          <a:p>
-            <a:pPr lvl="0" indent="0" marL="0">
-              <a:buNone/>
-            </a:pPr>
-            <a:r>
-              <a:rPr/>
-              <a:t>Figure 11</a:t>
+              <a:t>Chunk 16</a:t>
             </a:r>
           </a:p>
         </p:txBody>
@@ -10999,7 +10982,7 @@
             </a:pPr>
             <a:r>
               <a:rPr/>
-              <a:t>SAS output: Part17. Calculate correlations</a:t>
+              <a:t>SAS Code: Part16. Revised histogram with wide bins</a:t>
             </a:r>
           </a:p>
         </p:txBody>
@@ -11019,12 +11002,20 @@
           <a:bodyPr/>
           <a:lstStyle/>
           <a:p>
-            <a:pPr lvl="0" indent="0" marL="0">
-              <a:buNone/>
-            </a:pPr>
-            <a:r>
-              <a:rPr/>
-              <a:t>Figure 12</a:t>
+            <a:pPr lvl="0" indent="0">
+              <a:buNone/>
+            </a:pPr>
+            <a:r>
+              <a:rPr>
+                <a:latin typeface="Courier"/>
+              </a:rPr>
+              <a:t>
+proc sgplot
+    data=intro.fat2;
+  histogram ht / binstart=60 binwidth=5;
+  title "Histogram with wide bins";
+run;
+</a:t>
             </a:r>
           </a:p>
         </p:txBody>
@@ -11071,7 +11062,32 @@
             </a:pPr>
             <a:r>
               <a:rPr/>
-              <a:t>Chunk 18</a:t>
+              <a:t>SAS output: Part16. Revised histogram with wide bins</a:t>
+            </a:r>
+          </a:p>
+        </p:txBody>
+      </p:sp>
+      <p:sp>
+        <p:nvSpPr>
+          <p:cNvPr id="3" name="Content Placeholder 2"/>
+          <p:cNvSpPr>
+            <a:spLocks noGrp="1"/>
+          </p:cNvSpPr>
+          <p:nvPr>
+            <p:ph idx="1"/>
+          </p:nvPr>
+        </p:nvSpPr>
+        <p:spPr/>
+        <p:txBody>
+          <a:bodyPr/>
+          <a:lstStyle/>
+          <a:p>
+            <a:pPr lvl="0" indent="0" marL="0">
+              <a:buNone/>
+            </a:pPr>
+            <a:r>
+              <a:rPr/>
+              <a:t>Figure 10</a:t>
             </a:r>
           </a:p>
         </p:txBody>
@@ -11118,46 +11134,7 @@
             </a:pPr>
             <a:r>
               <a:rPr/>
-              <a:t>SAS Code: Part18. Save the correlations in a separate data file.</a:t>
-            </a:r>
-          </a:p>
-        </p:txBody>
-      </p:sp>
-      <p:sp>
-        <p:nvSpPr>
-          <p:cNvPr id="3" name="Content Placeholder 2"/>
-          <p:cNvSpPr>
-            <a:spLocks noGrp="1"/>
-          </p:cNvSpPr>
-          <p:nvPr>
-            <p:ph idx="1"/>
-          </p:nvPr>
-        </p:nvSpPr>
-        <p:spPr/>
-        <p:txBody>
-          <a:bodyPr/>
-          <a:lstStyle/>
-          <a:p>
-            <a:pPr lvl="0" indent="0">
-              <a:buNone/>
-            </a:pPr>
-            <a:r>
-              <a:rPr>
-                <a:latin typeface="Courier"/>
-              </a:rPr>
-              <a:t>
-proc corr
-    data=intro.fat2
-    noprint
-    outp=correlations;
-  var fat_brozek fat_siri;
-  with neck -- wrist;
-run;
-proc print 
-    data=correlations;
-  title "Correlation matrix output to a data set";
-run;
-</a:t>
+              <a:t>Chunk 17</a:t>
             </a:r>
           </a:p>
         </p:txBody>
@@ -11204,7 +11181,7 @@
             </a:pPr>
             <a:r>
               <a:rPr/>
-              <a:t>SAS output: Part18. Save the correlations in a separate data file.</a:t>
+              <a:t>SAS Code: Part17. Calculate correlations</a:t>
             </a:r>
           </a:p>
         </p:txBody>
@@ -11224,12 +11201,22 @@
           <a:bodyPr/>
           <a:lstStyle/>
           <a:p>
-            <a:pPr lvl="0" indent="0" marL="0">
-              <a:buNone/>
-            </a:pPr>
-            <a:r>
-              <a:rPr/>
-              <a:t>Figure 13</a:t>
+            <a:pPr lvl="0" indent="0">
+              <a:buNone/>
+            </a:pPr>
+            <a:r>
+              <a:rPr>
+                <a:latin typeface="Courier"/>
+              </a:rPr>
+              <a:t>
+proc corr
+    data=intro.fat2
+    noprob nosimple;
+  var fat_brozek fat_siri;
+  with neck -- wrist;
+  title "Correlation matrix";
+run;
+</a:t>
             </a:r>
           </a:p>
         </p:txBody>
@@ -11276,7 +11263,38 @@
             </a:pPr>
             <a:r>
               <a:rPr/>
-              <a:t>Chunk 2</a:t>
+              <a:t>QC check</a:t>
+            </a:r>
+          </a:p>
+        </p:txBody>
+      </p:sp>
+      <p:sp>
+        <p:nvSpPr>
+          <p:cNvPr id="3" name="Content Placeholder 2"/>
+          <p:cNvSpPr>
+            <a:spLocks noGrp="1"/>
+          </p:cNvSpPr>
+          <p:nvPr>
+            <p:ph idx="1"/>
+          </p:nvPr>
+        </p:nvSpPr>
+        <p:spPr/>
+        <p:txBody>
+          <a:bodyPr/>
+          <a:lstStyle/>
+          <a:p>
+            <a:pPr lvl="0" indent="0">
+              <a:buNone/>
+            </a:pPr>
+            <a:r>
+              <a:rPr>
+                <a:latin typeface="Courier"/>
+              </a:rPr>
+              <a:t>## [1] "&lt;!---Part11. Faulty approach for filtering out negative values---&gt;"
+## [2] "&lt;!---Part12. Counting missing values---&gt;"                          
+## [3] "&lt;!---Part13. Simple transformations---&gt;"                           
+## [4] "&lt;!---Part14. Display a histogram---&gt;"                              
+## [5] "&lt;!---Part15. Revised histogram with narrow bins---&gt;"</a:t>
             </a:r>
           </a:p>
         </p:txBody>
@@ -11323,7 +11341,7 @@
             </a:pPr>
             <a:r>
               <a:rPr/>
-              <a:t>SAS output: Part18. Save the correlations in a separate data file.</a:t>
+              <a:t>SAS output: Part17. Calculate correlations</a:t>
             </a:r>
           </a:p>
         </p:txBody>
@@ -11348,7 +11366,7 @@
             </a:pPr>
             <a:r>
               <a:rPr/>
-              <a:t>Figure 14</a:t>
+              <a:t>Figure 11</a:t>
             </a:r>
           </a:p>
         </p:txBody>
@@ -11395,7 +11413,32 @@
             </a:pPr>
             <a:r>
               <a:rPr/>
-              <a:t>Chunk 19</a:t>
+              <a:t>SAS output: Part17. Calculate correlations</a:t>
+            </a:r>
+          </a:p>
+        </p:txBody>
+      </p:sp>
+      <p:sp>
+        <p:nvSpPr>
+          <p:cNvPr id="3" name="Content Placeholder 2"/>
+          <p:cNvSpPr>
+            <a:spLocks noGrp="1"/>
+          </p:cNvSpPr>
+          <p:nvPr>
+            <p:ph idx="1"/>
+          </p:nvPr>
+        </p:nvSpPr>
+        <p:spPr/>
+        <p:txBody>
+          <a:bodyPr/>
+          <a:lstStyle/>
+          <a:p>
+            <a:pPr lvl="0" indent="0" marL="0">
+              <a:buNone/>
+            </a:pPr>
+            <a:r>
+              <a:rPr/>
+              <a:t>Figure 12</a:t>
             </a:r>
           </a:p>
         </p:txBody>
@@ -11442,46 +11485,7 @@
             </a:pPr>
             <a:r>
               <a:rPr/>
-              <a:t>SAS Code: Part19. Modify these correlations.</a:t>
-            </a:r>
-          </a:p>
-        </p:txBody>
-      </p:sp>
-      <p:sp>
-        <p:nvSpPr>
-          <p:cNvPr id="3" name="Content Placeholder 2"/>
-          <p:cNvSpPr>
-            <a:spLocks noGrp="1"/>
-          </p:cNvSpPr>
-          <p:nvPr>
-            <p:ph idx="1"/>
-          </p:nvPr>
-        </p:nvSpPr>
-        <p:spPr/>
-        <p:txBody>
-          <a:bodyPr/>
-          <a:lstStyle/>
-          <a:p>
-            <a:pPr lvl="0" indent="0">
-              <a:buNone/>
-            </a:pPr>
-            <a:r>
-              <a:rPr>
-                <a:latin typeface="Courier"/>
-              </a:rPr>
-              <a:t>
-data correlations;
-  set correlations;
-  if _type_="CORR";
-  drop type;
-  fat_brozek=round(100*fat_brozek);
-  fat_siri=round(100*fat_siri);
-run;
-proc sort
-    data=correlations;
-  by descending fat_brozek;
-run;
-</a:t>
+              <a:t>Chunk 18</a:t>
             </a:r>
           </a:p>
         </p:txBody>
@@ -11528,7 +11532,46 @@
             </a:pPr>
             <a:r>
               <a:rPr/>
-              <a:t>Chunk 20</a:t>
+              <a:t>SAS Code: Part18. Save the correlations in a separate data file.</a:t>
+            </a:r>
+          </a:p>
+        </p:txBody>
+      </p:sp>
+      <p:sp>
+        <p:nvSpPr>
+          <p:cNvPr id="3" name="Content Placeholder 2"/>
+          <p:cNvSpPr>
+            <a:spLocks noGrp="1"/>
+          </p:cNvSpPr>
+          <p:nvPr>
+            <p:ph idx="1"/>
+          </p:nvPr>
+        </p:nvSpPr>
+        <p:spPr/>
+        <p:txBody>
+          <a:bodyPr/>
+          <a:lstStyle/>
+          <a:p>
+            <a:pPr lvl="0" indent="0">
+              <a:buNone/>
+            </a:pPr>
+            <a:r>
+              <a:rPr>
+                <a:latin typeface="Courier"/>
+              </a:rPr>
+              <a:t>
+proc corr
+    data=intro.fat2
+    noprint
+    outp=correlations;
+  var fat_brozek fat_siri;
+  with neck -- wrist;
+run;
+proc print 
+    data=correlations;
+  title "Correlation matrix output to a data set";
+run;
+</a:t>
             </a:r>
           </a:p>
         </p:txBody>
@@ -11575,7 +11618,7 @@
             </a:pPr>
             <a:r>
               <a:rPr/>
-              <a:t>SAS Code: Part20. Print the modified correlations.</a:t>
+              <a:t>SAS output: Part18. Save the correlations in a separate data file.</a:t>
             </a:r>
           </a:p>
         </p:txBody>
@@ -11595,19 +11638,12 @@
           <a:bodyPr/>
           <a:lstStyle/>
           <a:p>
-            <a:pPr lvl="0" indent="0">
-              <a:buNone/>
-            </a:pPr>
-            <a:r>
-              <a:rPr>
-                <a:latin typeface="Courier"/>
-              </a:rPr>
-              <a:t>
-proc print 
-    data=correlations;
-  title "Rounded and re-ordered correlation matrix";
-run;
-</a:t>
+            <a:pPr lvl="0" indent="0" marL="0">
+              <a:buNone/>
+            </a:pPr>
+            <a:r>
+              <a:rPr/>
+              <a:t>Figure 13</a:t>
             </a:r>
           </a:p>
         </p:txBody>
@@ -11654,7 +11690,7 @@
             </a:pPr>
             <a:r>
               <a:rPr/>
-              <a:t>SAS output: Part20. Print the modified correlations.</a:t>
+              <a:t>SAS output: Part18. Save the correlations in a separate data file.</a:t>
             </a:r>
           </a:p>
         </p:txBody>
@@ -11679,7 +11715,7 @@
             </a:pPr>
             <a:r>
               <a:rPr/>
-              <a:t>Figure 15</a:t>
+              <a:t>Figure 14</a:t>
             </a:r>
           </a:p>
         </p:txBody>
@@ -11726,7 +11762,7 @@
             </a:pPr>
             <a:r>
               <a:rPr/>
-              <a:t>Chunk 21</a:t>
+              <a:t>Chunk 19</a:t>
             </a:r>
           </a:p>
         </p:txBody>
@@ -11773,7 +11809,7 @@
             </a:pPr>
             <a:r>
               <a:rPr/>
-              <a:t>SAS Code: Part21. Draw a scatterplot.</a:t>
+              <a:t>SAS Code: Part19. Modify these correlations.</a:t>
             </a:r>
           </a:p>
         </p:txBody>
@@ -11801,10 +11837,16 @@
                 <a:latin typeface="Courier"/>
               </a:rPr>
               <a:t>
-proc sgplot
-    data=intro.fat2;
-  scatter x=abdomen y=fat_brozek;
-  title1 "Simple scatterplot";
+data correlations;
+  set correlations;
+  if _type_="CORR";
+  drop type;
+  fat_brozek=round(100*fat_brozek);
+  fat_siri=round(100*fat_siri);
+run;
+proc sort
+    data=correlations;
+  by descending fat_brozek;
 run;
 </a:t>
             </a:r>
@@ -11853,32 +11895,7 @@
             </a:pPr>
             <a:r>
               <a:rPr/>
-              <a:t>SAS output: Part21. Draw a scatterplot.</a:t>
-            </a:r>
-          </a:p>
-        </p:txBody>
-      </p:sp>
-      <p:sp>
-        <p:nvSpPr>
-          <p:cNvPr id="3" name="Content Placeholder 2"/>
-          <p:cNvSpPr>
-            <a:spLocks noGrp="1"/>
-          </p:cNvSpPr>
-          <p:nvPr>
-            <p:ph idx="1"/>
-          </p:nvPr>
-        </p:nvSpPr>
-        <p:spPr/>
-        <p:txBody>
-          <a:bodyPr/>
-          <a:lstStyle/>
-          <a:p>
-            <a:pPr lvl="0" indent="0" marL="0">
-              <a:buNone/>
-            </a:pPr>
-            <a:r>
-              <a:rPr/>
-              <a:t>Figure 16</a:t>
+              <a:t>Chunk 20</a:t>
             </a:r>
           </a:p>
         </p:txBody>
@@ -11925,7 +11942,39 @@
             </a:pPr>
             <a:r>
               <a:rPr/>
-              <a:t>Chunk 22</a:t>
+              <a:t>SAS Code: Part20. Print the modified correlations.</a:t>
+            </a:r>
+          </a:p>
+        </p:txBody>
+      </p:sp>
+      <p:sp>
+        <p:nvSpPr>
+          <p:cNvPr id="3" name="Content Placeholder 2"/>
+          <p:cNvSpPr>
+            <a:spLocks noGrp="1"/>
+          </p:cNvSpPr>
+          <p:nvPr>
+            <p:ph idx="1"/>
+          </p:nvPr>
+        </p:nvSpPr>
+        <p:spPr/>
+        <p:txBody>
+          <a:bodyPr/>
+          <a:lstStyle/>
+          <a:p>
+            <a:pPr lvl="0" indent="0">
+              <a:buNone/>
+            </a:pPr>
+            <a:r>
+              <a:rPr>
+                <a:latin typeface="Courier"/>
+              </a:rPr>
+              <a:t>
+proc print 
+    data=correlations;
+  title "Rounded and re-ordered correlation matrix";
+run;
+</a:t>
             </a:r>
           </a:p>
         </p:txBody>
@@ -11972,7 +12021,7 @@
             </a:pPr>
             <a:r>
               <a:rPr/>
-              <a:t>SAS Code: Part02. Tell SAS where to find and store things.</a:t>
+              <a:t>QC check</a:t>
             </a:r>
           </a:p>
         </p:txBody>
@@ -11999,14 +12048,11 @@
               <a:rPr>
                 <a:latin typeface="Courier"/>
               </a:rPr>
-              <a:t>
-filename fat
-  "q:/introduction-to-sas/data/fat.txt";
-libname intro
-  "q:/introduction-to-sas/data";
-ods pdf file=
-  "q:/introduction-to-sas/results/5507-02-simon-continuous-variables.pdf";
-</a:t>
+              <a:t>## [1] "&lt;!---Part16. Revised histogram with wide bins---&gt;"              
+## [2] "&lt;!---Part17. Calculate correlations---&gt;"                        
+## [3] "&lt;!---Part18. Save the correlations in a separate data file.---&gt;"
+## [4] "&lt;!---Part19. Modify these correlations.---&gt;"                    
+## [5] "&lt;!---Part20. Print the modified correlations.---&gt;"</a:t>
             </a:r>
           </a:p>
         </p:txBody>
@@ -12053,7 +12099,7 @@
             </a:pPr>
             <a:r>
               <a:rPr/>
-              <a:t>SAS Code: Part22. Adding linear trend line.</a:t>
+              <a:t>SAS output: Part20. Print the modified correlations.</a:t>
             </a:r>
           </a:p>
         </p:txBody>
@@ -12073,21 +12119,12 @@
           <a:bodyPr/>
           <a:lstStyle/>
           <a:p>
-            <a:pPr lvl="0" indent="0">
-              <a:buNone/>
-            </a:pPr>
-            <a:r>
-              <a:rPr>
-                <a:latin typeface="Courier"/>
-              </a:rPr>
-              <a:t>
-proc sgplot
-    data=intro.fat2;
-  scatter x=abdomen y=fat_brozek;
-  reg x=abdomen y=fat_brozek;
-  title2 "with linear trend";
-run;
-</a:t>
+            <a:pPr lvl="0" indent="0" marL="0">
+              <a:buNone/>
+            </a:pPr>
+            <a:r>
+              <a:rPr/>
+              <a:t>Figure 15</a:t>
             </a:r>
           </a:p>
         </p:txBody>
@@ -12134,6 +12171,333 @@
             </a:pPr>
             <a:r>
               <a:rPr/>
+              <a:t>Chunk 21</a:t>
+            </a:r>
+          </a:p>
+        </p:txBody>
+      </p:sp>
+    </p:spTree>
+  </p:cSld>
+</p:sld>
+</file>
+
+<file path=ppt/slides/slide72.xml><?xml version="1.0" encoding="utf-8"?>
+<p:sld xmlns:a="http://schemas.openxmlformats.org/drawingml/2006/main" xmlns:r="http://schemas.openxmlformats.org/officeDocument/2006/relationships" xmlns:p="http://schemas.openxmlformats.org/presentationml/2006/main">
+  <p:cSld>
+    <p:spTree>
+      <p:nvGrpSpPr>
+        <p:cNvPr id="1" name=""/>
+        <p:cNvGrpSpPr/>
+        <p:nvPr/>
+      </p:nvGrpSpPr>
+      <p:grpSpPr>
+        <a:xfrm>
+          <a:off x="0" y="0"/>
+          <a:ext cx="0" cy="0"/>
+          <a:chOff x="0" y="0"/>
+          <a:chExt cx="0" cy="0"/>
+        </a:xfrm>
+      </p:grpSpPr>
+      <p:sp>
+        <p:nvSpPr>
+          <p:cNvPr id="2" name="Title 1"/>
+          <p:cNvSpPr>
+            <a:spLocks noGrp="1"/>
+          </p:cNvSpPr>
+          <p:nvPr>
+            <p:ph type="title"/>
+          </p:nvPr>
+        </p:nvSpPr>
+        <p:spPr/>
+        <p:txBody>
+          <a:bodyPr/>
+          <a:lstStyle/>
+          <a:p>
+            <a:pPr lvl="0" indent="0" marL="0">
+              <a:buNone/>
+            </a:pPr>
+            <a:r>
+              <a:rPr/>
+              <a:t>SAS Code: Part21. Draw a scatterplot.</a:t>
+            </a:r>
+          </a:p>
+        </p:txBody>
+      </p:sp>
+      <p:sp>
+        <p:nvSpPr>
+          <p:cNvPr id="3" name="Content Placeholder 2"/>
+          <p:cNvSpPr>
+            <a:spLocks noGrp="1"/>
+          </p:cNvSpPr>
+          <p:nvPr>
+            <p:ph idx="1"/>
+          </p:nvPr>
+        </p:nvSpPr>
+        <p:spPr/>
+        <p:txBody>
+          <a:bodyPr/>
+          <a:lstStyle/>
+          <a:p>
+            <a:pPr lvl="0" indent="0">
+              <a:buNone/>
+            </a:pPr>
+            <a:r>
+              <a:rPr>
+                <a:latin typeface="Courier"/>
+              </a:rPr>
+              <a:t>
+proc sgplot
+    data=intro.fat2;
+  scatter x=abdomen y=fat_brozek;
+  title1 "Simple scatterplot";
+run;
+</a:t>
+            </a:r>
+          </a:p>
+        </p:txBody>
+      </p:sp>
+    </p:spTree>
+  </p:cSld>
+</p:sld>
+</file>
+
+<file path=ppt/slides/slide73.xml><?xml version="1.0" encoding="utf-8"?>
+<p:sld xmlns:a="http://schemas.openxmlformats.org/drawingml/2006/main" xmlns:r="http://schemas.openxmlformats.org/officeDocument/2006/relationships" xmlns:p="http://schemas.openxmlformats.org/presentationml/2006/main">
+  <p:cSld>
+    <p:spTree>
+      <p:nvGrpSpPr>
+        <p:cNvPr id="1" name=""/>
+        <p:cNvGrpSpPr/>
+        <p:nvPr/>
+      </p:nvGrpSpPr>
+      <p:grpSpPr>
+        <a:xfrm>
+          <a:off x="0" y="0"/>
+          <a:ext cx="0" cy="0"/>
+          <a:chOff x="0" y="0"/>
+          <a:chExt cx="0" cy="0"/>
+        </a:xfrm>
+      </p:grpSpPr>
+      <p:sp>
+        <p:nvSpPr>
+          <p:cNvPr id="2" name="Title 1"/>
+          <p:cNvSpPr>
+            <a:spLocks noGrp="1"/>
+          </p:cNvSpPr>
+          <p:nvPr>
+            <p:ph type="title"/>
+          </p:nvPr>
+        </p:nvSpPr>
+        <p:spPr/>
+        <p:txBody>
+          <a:bodyPr/>
+          <a:lstStyle/>
+          <a:p>
+            <a:pPr lvl="0" indent="0" marL="0">
+              <a:buNone/>
+            </a:pPr>
+            <a:r>
+              <a:rPr/>
+              <a:t>SAS output: Part21. Draw a scatterplot.</a:t>
+            </a:r>
+          </a:p>
+        </p:txBody>
+      </p:sp>
+      <p:sp>
+        <p:nvSpPr>
+          <p:cNvPr id="3" name="Content Placeholder 2"/>
+          <p:cNvSpPr>
+            <a:spLocks noGrp="1"/>
+          </p:cNvSpPr>
+          <p:nvPr>
+            <p:ph idx="1"/>
+          </p:nvPr>
+        </p:nvSpPr>
+        <p:spPr/>
+        <p:txBody>
+          <a:bodyPr/>
+          <a:lstStyle/>
+          <a:p>
+            <a:pPr lvl="0" indent="0" marL="0">
+              <a:buNone/>
+            </a:pPr>
+            <a:r>
+              <a:rPr/>
+              <a:t>Figure 16</a:t>
+            </a:r>
+          </a:p>
+        </p:txBody>
+      </p:sp>
+    </p:spTree>
+  </p:cSld>
+</p:sld>
+</file>
+
+<file path=ppt/slides/slide74.xml><?xml version="1.0" encoding="utf-8"?>
+<p:sld xmlns:a="http://schemas.openxmlformats.org/drawingml/2006/main" xmlns:r="http://schemas.openxmlformats.org/officeDocument/2006/relationships" xmlns:p="http://schemas.openxmlformats.org/presentationml/2006/main">
+  <p:cSld>
+    <p:spTree>
+      <p:nvGrpSpPr>
+        <p:cNvPr id="1" name=""/>
+        <p:cNvGrpSpPr/>
+        <p:nvPr/>
+      </p:nvGrpSpPr>
+      <p:grpSpPr>
+        <a:xfrm>
+          <a:off x="0" y="0"/>
+          <a:ext cx="0" cy="0"/>
+          <a:chOff x="0" y="0"/>
+          <a:chExt cx="0" cy="0"/>
+        </a:xfrm>
+      </p:grpSpPr>
+      <p:sp>
+        <p:nvSpPr>
+          <p:cNvPr id="2" name="Title 1"/>
+          <p:cNvSpPr>
+            <a:spLocks noGrp="1"/>
+          </p:cNvSpPr>
+          <p:nvPr>
+            <p:ph type="title"/>
+          </p:nvPr>
+        </p:nvSpPr>
+        <p:spPr/>
+        <p:txBody>
+          <a:bodyPr/>
+          <a:lstStyle/>
+          <a:p>
+            <a:pPr lvl="0" indent="0" marL="0">
+              <a:buNone/>
+            </a:pPr>
+            <a:r>
+              <a:rPr/>
+              <a:t>Chunk 22</a:t>
+            </a:r>
+          </a:p>
+        </p:txBody>
+      </p:sp>
+    </p:spTree>
+  </p:cSld>
+</p:sld>
+</file>
+
+<file path=ppt/slides/slide75.xml><?xml version="1.0" encoding="utf-8"?>
+<p:sld xmlns:a="http://schemas.openxmlformats.org/drawingml/2006/main" xmlns:r="http://schemas.openxmlformats.org/officeDocument/2006/relationships" xmlns:p="http://schemas.openxmlformats.org/presentationml/2006/main">
+  <p:cSld>
+    <p:spTree>
+      <p:nvGrpSpPr>
+        <p:cNvPr id="1" name=""/>
+        <p:cNvGrpSpPr/>
+        <p:nvPr/>
+      </p:nvGrpSpPr>
+      <p:grpSpPr>
+        <a:xfrm>
+          <a:off x="0" y="0"/>
+          <a:ext cx="0" cy="0"/>
+          <a:chOff x="0" y="0"/>
+          <a:chExt cx="0" cy="0"/>
+        </a:xfrm>
+      </p:grpSpPr>
+      <p:sp>
+        <p:nvSpPr>
+          <p:cNvPr id="2" name="Title 1"/>
+          <p:cNvSpPr>
+            <a:spLocks noGrp="1"/>
+          </p:cNvSpPr>
+          <p:nvPr>
+            <p:ph type="title"/>
+          </p:nvPr>
+        </p:nvSpPr>
+        <p:spPr/>
+        <p:txBody>
+          <a:bodyPr/>
+          <a:lstStyle/>
+          <a:p>
+            <a:pPr lvl="0" indent="0" marL="0">
+              <a:buNone/>
+            </a:pPr>
+            <a:r>
+              <a:rPr/>
+              <a:t>SAS Code: Part22. Adding linear trend line.</a:t>
+            </a:r>
+          </a:p>
+        </p:txBody>
+      </p:sp>
+      <p:sp>
+        <p:nvSpPr>
+          <p:cNvPr id="3" name="Content Placeholder 2"/>
+          <p:cNvSpPr>
+            <a:spLocks noGrp="1"/>
+          </p:cNvSpPr>
+          <p:nvPr>
+            <p:ph idx="1"/>
+          </p:nvPr>
+        </p:nvSpPr>
+        <p:spPr/>
+        <p:txBody>
+          <a:bodyPr/>
+          <a:lstStyle/>
+          <a:p>
+            <a:pPr lvl="0" indent="0">
+              <a:buNone/>
+            </a:pPr>
+            <a:r>
+              <a:rPr>
+                <a:latin typeface="Courier"/>
+              </a:rPr>
+              <a:t>
+proc sgplot
+    data=intro.fat2;
+  scatter x=abdomen y=fat_brozek;
+  reg x=abdomen y=fat_brozek;
+  title2 "with linear trend";
+run;
+</a:t>
+            </a:r>
+          </a:p>
+        </p:txBody>
+      </p:sp>
+    </p:spTree>
+  </p:cSld>
+</p:sld>
+</file>
+
+<file path=ppt/slides/slide76.xml><?xml version="1.0" encoding="utf-8"?>
+<p:sld xmlns:a="http://schemas.openxmlformats.org/drawingml/2006/main" xmlns:r="http://schemas.openxmlformats.org/officeDocument/2006/relationships" xmlns:p="http://schemas.openxmlformats.org/presentationml/2006/main">
+  <p:cSld>
+    <p:spTree>
+      <p:nvGrpSpPr>
+        <p:cNvPr id="1" name=""/>
+        <p:cNvGrpSpPr/>
+        <p:nvPr/>
+      </p:nvGrpSpPr>
+      <p:grpSpPr>
+        <a:xfrm>
+          <a:off x="0" y="0"/>
+          <a:ext cx="0" cy="0"/>
+          <a:chOff x="0" y="0"/>
+          <a:chExt cx="0" cy="0"/>
+        </a:xfrm>
+      </p:grpSpPr>
+      <p:sp>
+        <p:nvSpPr>
+          <p:cNvPr id="2" name="Title 1"/>
+          <p:cNvSpPr>
+            <a:spLocks noGrp="1"/>
+          </p:cNvSpPr>
+          <p:nvPr>
+            <p:ph type="title"/>
+          </p:nvPr>
+        </p:nvSpPr>
+        <p:spPr/>
+        <p:txBody>
+          <a:bodyPr/>
+          <a:lstStyle/>
+          <a:p>
+            <a:pPr lvl="0" indent="0" marL="0">
+              <a:buNone/>
+            </a:pPr>
+            <a:r>
+              <a:rPr/>
               <a:t>SAS output: Part22. Adding linear trend line.</a:t>
             </a:r>
           </a:p>
@@ -12206,7 +12570,36 @@
             </a:pPr>
             <a:r>
               <a:rPr/>
-              <a:t>Chunk 3</a:t>
+              <a:t>QC check</a:t>
+            </a:r>
+          </a:p>
+        </p:txBody>
+      </p:sp>
+      <p:sp>
+        <p:nvSpPr>
+          <p:cNvPr id="3" name="Content Placeholder 2"/>
+          <p:cNvSpPr>
+            <a:spLocks noGrp="1"/>
+          </p:cNvSpPr>
+          <p:nvPr>
+            <p:ph idx="1"/>
+          </p:nvPr>
+        </p:nvSpPr>
+        <p:spPr/>
+        <p:txBody>
+          <a:bodyPr/>
+          <a:lstStyle/>
+          <a:p>
+            <a:pPr lvl="0" indent="0">
+              <a:buNone/>
+            </a:pPr>
+            <a:r>
+              <a:rPr>
+                <a:latin typeface="Courier"/>
+              </a:rPr>
+              <a:t>## [1] "&lt;!---Part21. Draw a scatterplot.---&gt;"      
+## [2] "&lt;!---Part22. Adding linear trend line.---&gt;"
+## [3] "&lt;!---Part23. Adding a smooth curve.---&gt;"</a:t>
             </a:r>
           </a:p>
         </p:txBody>
@@ -12253,42 +12646,7 @@
             </a:pPr>
             <a:r>
               <a:rPr/>
-              <a:t>SAS Code: Part03. Read in your data</a:t>
-            </a:r>
-          </a:p>
-        </p:txBody>
-      </p:sp>
-      <p:sp>
-        <p:nvSpPr>
-          <p:cNvPr id="3" name="Content Placeholder 2"/>
-          <p:cNvSpPr>
-            <a:spLocks noGrp="1"/>
-          </p:cNvSpPr>
-          <p:nvPr>
-            <p:ph idx="1"/>
-          </p:nvPr>
-        </p:nvSpPr>
-        <p:spPr/>
-        <p:txBody>
-          <a:bodyPr/>
-          <a:lstStyle/>
-          <a:p>
-            <a:pPr lvl="0" indent="0">
-              <a:buNone/>
-            </a:pPr>
-            <a:r>
-              <a:rPr>
-                <a:latin typeface="Courier"/>
-              </a:rPr>
-              <a:t>
-data intro.fat;
-  infile fat;
-  input 
-    case
-    fat_brozek
-    fat_siri
-    dens
-</a:t>
+              <a:t>Chunk 1</a:t>
             </a:r>
           </a:p>
         </p:txBody>

</xml_diff>